<commit_message>
added 7-segment display and level shifter
</commit_message>
<xml_diff>
--- a/project_01/docs/Tucker_EDES301_project_01_proposal.pptx
+++ b/project_01/docs/Tucker_EDES301_project_01_proposal.pptx
@@ -223,7 +223,7 @@
           <a:p>
             <a:fld id="{59041DB8-B66F-4DC8-A96E-33677E0F90FF}" type="datetimeFigureOut">
               <a:rPr lang="en-US" smtClean="0"/>
-              <a:t>2/23/25</a:t>
+              <a:t>2/28/25</a:t>
             </a:fld>
             <a:endParaRPr lang="en-US"/>
           </a:p>
@@ -388,7 +388,7 @@
           <a:p>
             <a:fld id="{DEB49C4A-65AC-492D-9701-81B46C3AD0E4}" type="datetimeFigureOut">
               <a:rPr lang="en-US" smtClean="0"/>
-              <a:t>2/23/25</a:t>
+              <a:t>2/28/25</a:t>
             </a:fld>
             <a:endParaRPr lang="en-US"/>
           </a:p>
@@ -2796,7 +2796,7 @@
           <a:p>
             <a:fld id="{384A29A4-78C8-47AB-BA06-22CB45938951}" type="datetime1">
               <a:rPr lang="en-US" smtClean="0"/>
-              <a:t>2/23/25</a:t>
+              <a:t>2/28/25</a:t>
             </a:fld>
             <a:endParaRPr lang="en-US"/>
           </a:p>
@@ -2991,7 +2991,7 @@
           <a:p>
             <a:fld id="{E1ED4ACF-2D82-46F2-A8E9-23963AA34E86}" type="datetime1">
               <a:rPr lang="en-US" smtClean="0"/>
-              <a:t>2/23/25</a:t>
+              <a:t>2/28/25</a:t>
             </a:fld>
             <a:endParaRPr lang="en-US"/>
           </a:p>
@@ -3185,7 +3185,7 @@
           <a:p>
             <a:fld id="{AE374B5B-21A0-4192-BF4C-38187F1A68D8}" type="datetime1">
               <a:rPr lang="en-US" smtClean="0"/>
-              <a:t>2/23/25</a:t>
+              <a:t>2/28/25</a:t>
             </a:fld>
             <a:endParaRPr lang="en-US"/>
           </a:p>
@@ -5526,7 +5526,7 @@
           <a:p>
             <a:fld id="{33B5CF7C-B333-48E1-A4A6-83A3C8B73AC0}" type="datetime1">
               <a:rPr lang="en-US" smtClean="0"/>
-              <a:t>2/23/25</a:t>
+              <a:t>2/28/25</a:t>
             </a:fld>
             <a:endParaRPr lang="en-US"/>
           </a:p>
@@ -5979,7 +5979,7 @@
           <a:p>
             <a:fld id="{AE320762-5CBF-4210-AB54-376B091119F8}" type="datetime1">
               <a:rPr lang="en-US" smtClean="0"/>
-              <a:t>2/23/25</a:t>
+              <a:t>2/28/25</a:t>
             </a:fld>
             <a:endParaRPr lang="en-US"/>
           </a:p>
@@ -6111,7 +6111,7 @@
           <a:p>
             <a:fld id="{7F0DB371-BF5F-4058-A212-1A908E4D2674}" type="datetime1">
               <a:rPr lang="en-US" smtClean="0"/>
-              <a:t>2/23/25</a:t>
+              <a:t>2/28/25</a:t>
             </a:fld>
             <a:endParaRPr lang="en-US"/>
           </a:p>
@@ -8044,7 +8044,7 @@
           <a:p>
             <a:fld id="{60A4083B-90AA-48CF-BAD5-00AA24D7F288}" type="datetime1">
               <a:rPr lang="en-US" smtClean="0"/>
-              <a:t>2/23/25</a:t>
+              <a:t>2/28/25</a:t>
             </a:fld>
             <a:endParaRPr lang="en-US"/>
           </a:p>
@@ -10303,7 +10303,7 @@
             <a:fld id="{F5BAF629-ECA2-4CF3-B790-9D9BDED98269}" type="datetime1">
               <a:rPr lang="en-US" smtClean="0"/>
               <a:pPr/>
-              <a:t>2/23/25</a:t>
+              <a:t>2/28/25</a:t>
             </a:fld>
             <a:endParaRPr lang="en-US"/>
           </a:p>
@@ -14598,7 +14598,7 @@
             <a:fld id="{B51B2453-8663-4C69-AF73-9FD7B1DEC5D0}" type="datetime1">
               <a:rPr lang="en-US" smtClean="0"/>
               <a:pPr/>
-              <a:t>2/23/25</a:t>
+              <a:t>2/28/25</a:t>
             </a:fld>
             <a:endParaRPr lang="en-US" dirty="0"/>
           </a:p>
@@ -15083,7 +15083,7 @@
               <a:rPr lang="en-US" sz="6000" dirty="0"/>
             </a:br>
             <a:br>
-              <a:rPr lang="en-US" dirty="0"/>
+              <a:rPr lang="en-US" sz="4900" dirty="0"/>
             </a:br>
             <a:r>
               <a:rPr lang="en-US" dirty="0"/>
@@ -15093,6 +15093,9 @@
               <a:rPr lang="en-US" sz="6000" dirty="0"/>
               <a:t>Light-up Study Timer </a:t>
             </a:r>
+            <a:br>
+              <a:rPr lang="en-US" sz="6000" dirty="0"/>
+            </a:br>
             <a:br>
               <a:rPr lang="en-US" sz="6000" dirty="0"/>
             </a:br>
@@ -15126,7 +15129,7 @@
           <a:p>
             <a:r>
               <a:rPr lang="en-US" dirty="0"/>
-              <a:t>February 23, 2025</a:t>
+              <a:t>Updated February 28, 2025</a:t>
             </a:r>
           </a:p>
           <a:p>
@@ -15223,14 +15226,14 @@
             <p:ph idx="1"/>
             <p:extLst>
               <p:ext uri="{D42A27DB-BD31-4B8C-83A1-F6EECF244321}">
-                <p14:modId xmlns:p14="http://schemas.microsoft.com/office/powerpoint/2010/main" val="4277309029"/>
+                <p14:modId xmlns:p14="http://schemas.microsoft.com/office/powerpoint/2010/main" val="1643906721"/>
               </p:ext>
             </p:extLst>
           </p:nvPr>
         </p:nvGraphicFramePr>
         <p:xfrm>
           <a:off x="609600" y="1295400"/>
-          <a:ext cx="10972800" cy="2865120"/>
+          <a:ext cx="10972800" cy="3606800"/>
         </p:xfrm>
         <a:graphic>
           <a:graphicData uri="http://schemas.openxmlformats.org/drawingml/2006/table">
@@ -15364,7 +15367,7 @@
                     <a:p>
                       <a:r>
                         <a:rPr lang="en-US" dirty="0"/>
-                        <a:t>In parts kit?</a:t>
+                        <a:t>Yes</a:t>
                       </a:r>
                     </a:p>
                   </a:txBody>
@@ -15513,9 +15516,75 @@
                     <a:bodyPr/>
                     <a:lstStyle/>
                     <a:p>
+                      <a:pPr marL="0" marR="0" lvl="0" indent="0" algn="l" defTabSz="914400" rtl="0" eaLnBrk="1" fontAlgn="auto" latinLnBrk="0" hangingPunct="1">
+                        <a:lnSpc>
+                          <a:spcPct val="100000"/>
+                        </a:lnSpc>
+                        <a:spcBef>
+                          <a:spcPts val="0"/>
+                        </a:spcBef>
+                        <a:spcAft>
+                          <a:spcPts val="0"/>
+                        </a:spcAft>
+                        <a:buClrTx/>
+                        <a:buSzTx/>
+                        <a:buFontTx/>
+                        <a:buNone/>
+                        <a:tabLst/>
+                        <a:defRPr/>
+                      </a:pPr>
                       <a:r>
                         <a:rPr lang="en-US" dirty="0">
                           <a:hlinkClick r:id="rId5"/>
+                        </a:rPr>
+                        <a:t>Level shifter</a:t>
+                      </a:r>
+                      <a:endParaRPr lang="en-US" dirty="0"/>
+                    </a:p>
+                  </a:txBody>
+                  <a:tcPr/>
+                </a:tc>
+                <a:tc>
+                  <a:txBody>
+                    <a:bodyPr/>
+                    <a:lstStyle/>
+                    <a:p>
+                      <a:r>
+                        <a:rPr lang="en-US" dirty="0"/>
+                        <a:t>Yes</a:t>
+                      </a:r>
+                    </a:p>
+                  </a:txBody>
+                  <a:tcPr/>
+                </a:tc>
+                <a:tc>
+                  <a:txBody>
+                    <a:bodyPr/>
+                    <a:lstStyle/>
+                    <a:p>
+                      <a:r>
+                        <a:rPr lang="en-US" dirty="0"/>
+                        <a:t>$1.25</a:t>
+                      </a:r>
+                    </a:p>
+                  </a:txBody>
+                  <a:tcPr/>
+                </a:tc>
+                <a:extLst>
+                  <a:ext uri="{0D108BD9-81ED-4DB2-BD59-A6C34878D82A}">
+                    <a16:rowId xmlns:a16="http://schemas.microsoft.com/office/drawing/2014/main" val="3856889315"/>
+                  </a:ext>
+                </a:extLst>
+              </a:tr>
+              <a:tr h="370840">
+                <a:tc>
+                  <a:txBody>
+                    <a:bodyPr/>
+                    <a:lstStyle/>
+                    <a:p>
+                      <a:r>
+                        <a:rPr lang="en-US" dirty="0">
+                          <a:hlinkClick r:id="rId6"/>
                         </a:rPr>
                         <a:t>Prism crystal ball</a:t>
                       </a:r>
@@ -15553,6 +15622,52 @@
                 <a:extLst>
                   <a:ext uri="{0D108BD9-81ED-4DB2-BD59-A6C34878D82A}">
                     <a16:rowId xmlns:a16="http://schemas.microsoft.com/office/drawing/2014/main" val="1757493575"/>
+                  </a:ext>
+                </a:extLst>
+              </a:tr>
+              <a:tr h="370840">
+                <a:tc>
+                  <a:txBody>
+                    <a:bodyPr/>
+                    <a:lstStyle/>
+                    <a:p>
+                      <a:r>
+                        <a:rPr lang="en-US" dirty="0"/>
+                        <a:t>7-segment display</a:t>
+                      </a:r>
+                    </a:p>
+                  </a:txBody>
+                  <a:tcPr/>
+                </a:tc>
+                <a:tc>
+                  <a:txBody>
+                    <a:bodyPr/>
+                    <a:lstStyle/>
+                    <a:p>
+                      <a:r>
+                        <a:rPr lang="en-US" dirty="0"/>
+                        <a:t>In parts kit</a:t>
+                      </a:r>
+                    </a:p>
+                  </a:txBody>
+                  <a:tcPr/>
+                </a:tc>
+                <a:tc>
+                  <a:txBody>
+                    <a:bodyPr/>
+                    <a:lstStyle/>
+                    <a:p>
+                      <a:r>
+                        <a:rPr lang="en-US" dirty="0"/>
+                        <a:t>--</a:t>
+                      </a:r>
+                    </a:p>
+                  </a:txBody>
+                  <a:tcPr/>
+                </a:tc>
+                <a:extLst>
+                  <a:ext uri="{0D108BD9-81ED-4DB2-BD59-A6C34878D82A}">
+                    <a16:rowId xmlns:a16="http://schemas.microsoft.com/office/drawing/2014/main" val="2575913597"/>
                   </a:ext>
                 </a:extLst>
               </a:tr>
@@ -17517,8 +17632,8 @@
         </p:nvSpPr>
         <p:spPr>
           <a:xfrm>
-            <a:off x="6544470" y="3466151"/>
-            <a:ext cx="2792896" cy="1041345"/>
+            <a:off x="6541604" y="3352800"/>
+            <a:ext cx="2792896" cy="420049"/>
           </a:xfrm>
           <a:prstGeom prst="rect">
             <a:avLst/>
@@ -17577,8 +17692,8 @@
         </p:nvSpPr>
         <p:spPr>
           <a:xfrm>
-            <a:off x="6775060" y="1344525"/>
-            <a:ext cx="2305392" cy="610582"/>
+            <a:off x="8574608" y="1713518"/>
+            <a:ext cx="1718508" cy="610582"/>
           </a:xfrm>
           <a:prstGeom prst="rect">
             <a:avLst/>
@@ -17710,8 +17825,8 @@
         </p:nvSpPr>
         <p:spPr>
           <a:xfrm>
-            <a:off x="6376686" y="2126089"/>
-            <a:ext cx="3757914" cy="1041345"/>
+            <a:off x="6544470" y="2451072"/>
+            <a:ext cx="3757914" cy="773749"/>
           </a:xfrm>
           <a:prstGeom prst="rect">
             <a:avLst/>
@@ -17783,7 +17898,7 @@
         </p:nvSpPr>
         <p:spPr>
           <a:xfrm>
-            <a:off x="5096023" y="1877778"/>
+            <a:off x="5067300" y="1834143"/>
             <a:ext cx="598513" cy="369332"/>
           </a:xfrm>
           <a:prstGeom prst="rect">
@@ -17822,7 +17937,7 @@
         </p:nvSpPr>
         <p:spPr>
           <a:xfrm>
-            <a:off x="4423944" y="3802157"/>
+            <a:off x="4399340" y="3378159"/>
             <a:ext cx="1261067" cy="369332"/>
           </a:xfrm>
           <a:prstGeom prst="rect">
@@ -17865,8 +17980,8 @@
         </p:nvCxnSpPr>
         <p:spPr>
           <a:xfrm>
-            <a:off x="5685011" y="3986823"/>
-            <a:ext cx="859459" cy="1"/>
+            <a:off x="5660407" y="3562825"/>
+            <a:ext cx="881197" cy="0"/>
           </a:xfrm>
           <a:prstGeom prst="line">
             <a:avLst/>
@@ -17906,7 +18021,7 @@
         </p:nvSpPr>
         <p:spPr>
           <a:xfrm>
-            <a:off x="4945714" y="2462096"/>
+            <a:off x="4956825" y="2653280"/>
             <a:ext cx="745373" cy="369332"/>
           </a:xfrm>
           <a:prstGeom prst="rect">
@@ -17949,8 +18064,8 @@
         </p:nvCxnSpPr>
         <p:spPr>
           <a:xfrm>
-            <a:off x="5691087" y="2646762"/>
-            <a:ext cx="685599" cy="0"/>
+            <a:off x="5702198" y="2837946"/>
+            <a:ext cx="842272" cy="1"/>
           </a:xfrm>
           <a:prstGeom prst="line">
             <a:avLst/>
@@ -18023,25 +18138,25 @@
       </p:cxnSp>
       <p:cxnSp>
         <p:nvCxnSpPr>
-          <p:cNvPr id="54" name="Elbow Connector 53">
+          <p:cNvPr id="7" name="Straight Connector 6">
             <a:extLst>
               <a:ext uri="{FF2B5EF4-FFF2-40B4-BE49-F238E27FC236}">
-                <a16:creationId xmlns:a16="http://schemas.microsoft.com/office/drawing/2014/main" id="{EB16E2CD-7A73-C0AE-7379-0176EEFFA2F8}"/>
+                <a16:creationId xmlns:a16="http://schemas.microsoft.com/office/drawing/2014/main" id="{94419C2B-EF4A-05E7-1D84-A2DA82BF2447}"/>
               </a:ext>
             </a:extLst>
           </p:cNvPr>
           <p:cNvCxnSpPr>
             <a:cxnSpLocks/>
-            <a:endCxn id="11" idx="1"/>
+            <a:endCxn id="16" idx="1"/>
           </p:cNvCxnSpPr>
           <p:nvPr/>
         </p:nvCxnSpPr>
         <p:spPr>
-          <a:xfrm flipV="1">
-            <a:off x="5685011" y="1649816"/>
-            <a:ext cx="1090049" cy="420185"/>
+          <a:xfrm>
+            <a:off x="5685011" y="2018809"/>
+            <a:ext cx="859459" cy="0"/>
           </a:xfrm>
-          <a:prstGeom prst="bentConnector3">
+          <a:prstGeom prst="line">
             <a:avLst/>
           </a:prstGeom>
           <a:ln w="28575">
@@ -18065,6 +18180,253 @@
           </a:fontRef>
         </p:style>
       </p:cxnSp>
+      <p:sp>
+        <p:nvSpPr>
+          <p:cNvPr id="16" name="Rectangle 15">
+            <a:extLst>
+              <a:ext uri="{FF2B5EF4-FFF2-40B4-BE49-F238E27FC236}">
+                <a16:creationId xmlns:a16="http://schemas.microsoft.com/office/drawing/2014/main" id="{5965B9DC-C733-D264-0B85-3536D882C3AA}"/>
+              </a:ext>
+            </a:extLst>
+          </p:cNvPr>
+          <p:cNvSpPr/>
+          <p:nvPr/>
+        </p:nvSpPr>
+        <p:spPr>
+          <a:xfrm>
+            <a:off x="6544470" y="1713518"/>
+            <a:ext cx="1562100" cy="610582"/>
+          </a:xfrm>
+          <a:prstGeom prst="rect">
+            <a:avLst/>
+          </a:prstGeom>
+        </p:spPr>
+        <p:style>
+          <a:lnRef idx="2">
+            <a:schemeClr val="accent1">
+              <a:shade val="15000"/>
+            </a:schemeClr>
+          </a:lnRef>
+          <a:fillRef idx="1">
+            <a:schemeClr val="accent1"/>
+          </a:fillRef>
+          <a:effectRef idx="0">
+            <a:schemeClr val="accent1"/>
+          </a:effectRef>
+          <a:fontRef idx="minor">
+            <a:schemeClr val="lt1"/>
+          </a:fontRef>
+        </p:style>
+        <p:txBody>
+          <a:bodyPr rtlCol="0" anchor="ctr"/>
+          <a:lstStyle/>
+          <a:p>
+            <a:pPr algn="ctr"/>
+            <a:r>
+              <a:rPr lang="en-US" b="0" i="0" dirty="0">
+                <a:solidFill>
+                  <a:schemeClr val="bg1"/>
+                </a:solidFill>
+                <a:effectLst/>
+                <a:latin typeface="Proxima Nova"/>
+              </a:rPr>
+              <a:t>Level Shifter</a:t>
+            </a:r>
+            <a:endParaRPr lang="en-US" dirty="0">
+              <a:solidFill>
+                <a:schemeClr val="bg1"/>
+              </a:solidFill>
+            </a:endParaRPr>
+          </a:p>
+        </p:txBody>
+      </p:sp>
+      <p:cxnSp>
+        <p:nvCxnSpPr>
+          <p:cNvPr id="20" name="Straight Connector 19">
+            <a:extLst>
+              <a:ext uri="{FF2B5EF4-FFF2-40B4-BE49-F238E27FC236}">
+                <a16:creationId xmlns:a16="http://schemas.microsoft.com/office/drawing/2014/main" id="{81B33909-3E86-2337-AA7A-37E7295BAB72}"/>
+              </a:ext>
+            </a:extLst>
+          </p:cNvPr>
+          <p:cNvCxnSpPr>
+            <a:cxnSpLocks/>
+            <a:stCxn id="16" idx="3"/>
+            <a:endCxn id="11" idx="1"/>
+          </p:cNvCxnSpPr>
+          <p:nvPr/>
+        </p:nvCxnSpPr>
+        <p:spPr>
+          <a:xfrm>
+            <a:off x="8106570" y="2018809"/>
+            <a:ext cx="468038" cy="0"/>
+          </a:xfrm>
+          <a:prstGeom prst="line">
+            <a:avLst/>
+          </a:prstGeom>
+          <a:ln w="28575">
+            <a:solidFill>
+              <a:schemeClr val="tx1"/>
+            </a:solidFill>
+          </a:ln>
+        </p:spPr>
+        <p:style>
+          <a:lnRef idx="1">
+            <a:schemeClr val="accent1"/>
+          </a:lnRef>
+          <a:fillRef idx="0">
+            <a:schemeClr val="accent1"/>
+          </a:fillRef>
+          <a:effectRef idx="0">
+            <a:schemeClr val="accent1"/>
+          </a:effectRef>
+          <a:fontRef idx="minor">
+            <a:schemeClr val="tx1"/>
+          </a:fontRef>
+        </p:style>
+      </p:cxnSp>
+      <p:sp>
+        <p:nvSpPr>
+          <p:cNvPr id="48" name="TextBox 47">
+            <a:extLst>
+              <a:ext uri="{FF2B5EF4-FFF2-40B4-BE49-F238E27FC236}">
+                <a16:creationId xmlns:a16="http://schemas.microsoft.com/office/drawing/2014/main" id="{392A5A5B-EA43-2060-3AB3-8E8E04072AC3}"/>
+              </a:ext>
+            </a:extLst>
+          </p:cNvPr>
+          <p:cNvSpPr txBox="1"/>
+          <p:nvPr/>
+        </p:nvSpPr>
+        <p:spPr>
+          <a:xfrm>
+            <a:off x="5067299" y="3993379"/>
+            <a:ext cx="598513" cy="369332"/>
+          </a:xfrm>
+          <a:prstGeom prst="rect">
+            <a:avLst/>
+          </a:prstGeom>
+          <a:noFill/>
+        </p:spPr>
+        <p:txBody>
+          <a:bodyPr wrap="square" rtlCol="0">
+            <a:spAutoFit/>
+          </a:bodyPr>
+          <a:lstStyle/>
+          <a:p>
+            <a:r>
+              <a:rPr lang="en-US" dirty="0">
+                <a:solidFill>
+                  <a:schemeClr val="bg1"/>
+                </a:solidFill>
+              </a:rPr>
+              <a:t>I2C</a:t>
+            </a:r>
+          </a:p>
+        </p:txBody>
+      </p:sp>
+      <p:cxnSp>
+        <p:nvCxnSpPr>
+          <p:cNvPr id="49" name="Straight Connector 48">
+            <a:extLst>
+              <a:ext uri="{FF2B5EF4-FFF2-40B4-BE49-F238E27FC236}">
+                <a16:creationId xmlns:a16="http://schemas.microsoft.com/office/drawing/2014/main" id="{3BCAB1F6-8F20-CFD8-E961-64AD90204EBA}"/>
+              </a:ext>
+            </a:extLst>
+          </p:cNvPr>
+          <p:cNvCxnSpPr>
+            <a:cxnSpLocks/>
+          </p:cNvCxnSpPr>
+          <p:nvPr/>
+        </p:nvCxnSpPr>
+        <p:spPr>
+          <a:xfrm>
+            <a:off x="5685011" y="4178045"/>
+            <a:ext cx="881197" cy="0"/>
+          </a:xfrm>
+          <a:prstGeom prst="line">
+            <a:avLst/>
+          </a:prstGeom>
+          <a:ln w="28575">
+            <a:solidFill>
+              <a:schemeClr val="tx1"/>
+            </a:solidFill>
+          </a:ln>
+        </p:spPr>
+        <p:style>
+          <a:lnRef idx="1">
+            <a:schemeClr val="accent1"/>
+          </a:lnRef>
+          <a:fillRef idx="0">
+            <a:schemeClr val="accent1"/>
+          </a:fillRef>
+          <a:effectRef idx="0">
+            <a:schemeClr val="accent1"/>
+          </a:effectRef>
+          <a:fontRef idx="minor">
+            <a:schemeClr val="tx1"/>
+          </a:fontRef>
+        </p:style>
+      </p:cxnSp>
+      <p:sp>
+        <p:nvSpPr>
+          <p:cNvPr id="50" name="Rectangle 49">
+            <a:extLst>
+              <a:ext uri="{FF2B5EF4-FFF2-40B4-BE49-F238E27FC236}">
+                <a16:creationId xmlns:a16="http://schemas.microsoft.com/office/drawing/2014/main" id="{349E9EF3-57F4-E02D-4203-BBEB221E1113}"/>
+              </a:ext>
+            </a:extLst>
+          </p:cNvPr>
+          <p:cNvSpPr/>
+          <p:nvPr/>
+        </p:nvSpPr>
+        <p:spPr>
+          <a:xfrm>
+            <a:off x="6541604" y="3942662"/>
+            <a:ext cx="2792896" cy="420049"/>
+          </a:xfrm>
+          <a:prstGeom prst="rect">
+            <a:avLst/>
+          </a:prstGeom>
+        </p:spPr>
+        <p:style>
+          <a:lnRef idx="2">
+            <a:schemeClr val="accent1">
+              <a:shade val="15000"/>
+            </a:schemeClr>
+          </a:lnRef>
+          <a:fillRef idx="1">
+            <a:schemeClr val="accent1"/>
+          </a:fillRef>
+          <a:effectRef idx="0">
+            <a:schemeClr val="accent1"/>
+          </a:effectRef>
+          <a:fontRef idx="minor">
+            <a:schemeClr val="lt1"/>
+          </a:fontRef>
+        </p:style>
+        <p:txBody>
+          <a:bodyPr rtlCol="0" anchor="ctr"/>
+          <a:lstStyle/>
+          <a:p>
+            <a:pPr algn="ctr"/>
+            <a:r>
+              <a:rPr lang="en-US" b="0" i="0" dirty="0">
+                <a:solidFill>
+                  <a:schemeClr val="bg1"/>
+                </a:solidFill>
+                <a:effectLst/>
+                <a:latin typeface="Proxima Nova"/>
+              </a:rPr>
+              <a:t>7-segment display</a:t>
+            </a:r>
+            <a:endParaRPr lang="en-US" dirty="0">
+              <a:solidFill>
+                <a:schemeClr val="bg1"/>
+              </a:solidFill>
+            </a:endParaRPr>
+          </a:p>
+        </p:txBody>
+      </p:sp>
     </p:spTree>
     <p:extLst>
       <p:ext uri="{BB962C8B-B14F-4D97-AF65-F5344CB8AC3E}">
@@ -18149,7 +18511,7 @@
         </p:nvSpPr>
         <p:spPr>
           <a:xfrm>
-            <a:off x="2892115" y="1543050"/>
+            <a:off x="2892115" y="2143347"/>
             <a:ext cx="2792896" cy="3143250"/>
           </a:xfrm>
           <a:prstGeom prst="roundRect">
@@ -18199,8 +18561,8 @@
         </p:nvSpPr>
         <p:spPr>
           <a:xfrm>
-            <a:off x="6988960" y="3733866"/>
-            <a:ext cx="2792896" cy="1041345"/>
+            <a:off x="7082462" y="2499676"/>
+            <a:ext cx="2792896" cy="483293"/>
           </a:xfrm>
           <a:prstGeom prst="rect">
             <a:avLst/>
@@ -18259,7 +18621,7 @@
         </p:nvSpPr>
         <p:spPr>
           <a:xfrm>
-            <a:off x="7232712" y="1545035"/>
+            <a:off x="8727742" y="4227678"/>
             <a:ext cx="2305392" cy="610582"/>
           </a:xfrm>
           <a:prstGeom prst="rect">
@@ -18332,8 +18694,8 @@
         </p:nvSpPr>
         <p:spPr>
           <a:xfrm>
-            <a:off x="3476436" y="5259496"/>
-            <a:ext cx="1624253" cy="610582"/>
+            <a:off x="6453411" y="4981307"/>
+            <a:ext cx="1624253" cy="610580"/>
           </a:xfrm>
           <a:prstGeom prst="rect">
             <a:avLst/>
@@ -18392,7 +18754,7 @@
         </p:nvSpPr>
         <p:spPr>
           <a:xfrm>
-            <a:off x="6506451" y="2424069"/>
+            <a:off x="6599953" y="1349268"/>
             <a:ext cx="3757914" cy="1041345"/>
           </a:xfrm>
           <a:prstGeom prst="rect">
@@ -18462,14 +18824,14 @@
           </p:cNvPr>
           <p:cNvCxnSpPr>
             <a:cxnSpLocks/>
-            <a:stCxn id="11" idx="0"/>
+            <a:stCxn id="20" idx="1"/>
           </p:cNvCxnSpPr>
           <p:nvPr/>
         </p:nvCxnSpPr>
         <p:spPr>
-          <a:xfrm flipV="1">
-            <a:off x="4288563" y="4686300"/>
-            <a:ext cx="0" cy="573196"/>
+          <a:xfrm flipH="1">
+            <a:off x="5685011" y="4866316"/>
+            <a:ext cx="601489" cy="0"/>
           </a:xfrm>
           <a:prstGeom prst="line">
             <a:avLst/>
@@ -18509,7 +18871,7 @@
         </p:nvSpPr>
         <p:spPr>
           <a:xfrm>
-            <a:off x="5734349" y="2745343"/>
+            <a:off x="5749480" y="2104900"/>
             <a:ext cx="757511" cy="369332"/>
           </a:xfrm>
           <a:prstGeom prst="rect">
@@ -18548,7 +18910,7 @@
         </p:nvSpPr>
         <p:spPr>
           <a:xfrm>
-            <a:off x="4343601" y="4766424"/>
+            <a:off x="5676900" y="4421965"/>
             <a:ext cx="685599" cy="369332"/>
           </a:xfrm>
           <a:prstGeom prst="rect">
@@ -18587,8 +18949,8 @@
         </p:nvSpPr>
         <p:spPr>
           <a:xfrm>
-            <a:off x="6277598" y="1295400"/>
-            <a:ext cx="4215620" cy="3644459"/>
+            <a:off x="6371100" y="1201902"/>
+            <a:ext cx="4215620" cy="2471737"/>
           </a:xfrm>
           <a:prstGeom prst="roundRect">
             <a:avLst/>
@@ -18648,14 +19010,13 @@
           <p:cNvCxnSpPr>
             <a:cxnSpLocks/>
             <a:stCxn id="25" idx="1"/>
-            <a:endCxn id="7" idx="3"/>
           </p:cNvCxnSpPr>
           <p:nvPr/>
         </p:nvCxnSpPr>
         <p:spPr>
           <a:xfrm flipH="1" flipV="1">
-            <a:off x="5685011" y="3114675"/>
-            <a:ext cx="592587" cy="2955"/>
+            <a:off x="5676900" y="2436035"/>
+            <a:ext cx="694200" cy="1736"/>
           </a:xfrm>
           <a:prstGeom prst="line">
             <a:avLst/>
@@ -18695,7 +19056,7 @@
         </p:nvSpPr>
         <p:spPr>
           <a:xfrm>
-            <a:off x="728931" y="2809384"/>
+            <a:off x="728931" y="3409681"/>
             <a:ext cx="1624253" cy="610582"/>
           </a:xfrm>
           <a:prstGeom prst="rect">
@@ -18755,7 +19116,7 @@
         </p:nvSpPr>
         <p:spPr>
           <a:xfrm>
-            <a:off x="2367775" y="2760075"/>
+            <a:off x="2367775" y="3360372"/>
             <a:ext cx="757511" cy="369332"/>
           </a:xfrm>
           <a:prstGeom prst="rect">
@@ -18798,7 +19159,7 @@
         </p:nvCxnSpPr>
         <p:spPr>
           <a:xfrm flipH="1">
-            <a:off x="2353184" y="3114675"/>
+            <a:off x="2353184" y="3714972"/>
             <a:ext cx="538931" cy="0"/>
           </a:xfrm>
           <a:prstGeom prst="line">
@@ -18825,6 +19186,273 @@
           </a:fontRef>
         </p:style>
       </p:cxnSp>
+      <p:sp>
+        <p:nvSpPr>
+          <p:cNvPr id="3" name="Rectangle 2">
+            <a:extLst>
+              <a:ext uri="{FF2B5EF4-FFF2-40B4-BE49-F238E27FC236}">
+                <a16:creationId xmlns:a16="http://schemas.microsoft.com/office/drawing/2014/main" id="{52C749F6-EED1-7513-9A10-B516CFB6D79A}"/>
+              </a:ext>
+            </a:extLst>
+          </p:cNvPr>
+          <p:cNvSpPr/>
+          <p:nvPr/>
+        </p:nvSpPr>
+        <p:spPr>
+          <a:xfrm>
+            <a:off x="6453411" y="4227678"/>
+            <a:ext cx="1624253" cy="610582"/>
+          </a:xfrm>
+          <a:prstGeom prst="rect">
+            <a:avLst/>
+          </a:prstGeom>
+        </p:spPr>
+        <p:style>
+          <a:lnRef idx="2">
+            <a:schemeClr val="accent1">
+              <a:shade val="15000"/>
+            </a:schemeClr>
+          </a:lnRef>
+          <a:fillRef idx="1">
+            <a:schemeClr val="accent1"/>
+          </a:fillRef>
+          <a:effectRef idx="0">
+            <a:schemeClr val="accent1"/>
+          </a:effectRef>
+          <a:fontRef idx="minor">
+            <a:schemeClr val="lt1"/>
+          </a:fontRef>
+        </p:style>
+        <p:txBody>
+          <a:bodyPr rtlCol="0" anchor="ctr"/>
+          <a:lstStyle/>
+          <a:p>
+            <a:pPr algn="ctr"/>
+            <a:r>
+              <a:rPr lang="en-US" b="0" i="0" dirty="0">
+                <a:solidFill>
+                  <a:schemeClr val="bg1"/>
+                </a:solidFill>
+                <a:effectLst/>
+                <a:latin typeface="Proxima Nova"/>
+              </a:rPr>
+              <a:t>Level Shifter</a:t>
+            </a:r>
+            <a:endParaRPr lang="en-US" dirty="0">
+              <a:solidFill>
+                <a:schemeClr val="bg1"/>
+              </a:solidFill>
+            </a:endParaRPr>
+          </a:p>
+        </p:txBody>
+      </p:sp>
+      <p:sp>
+        <p:nvSpPr>
+          <p:cNvPr id="20" name="Rounded Rectangle 19">
+            <a:extLst>
+              <a:ext uri="{FF2B5EF4-FFF2-40B4-BE49-F238E27FC236}">
+                <a16:creationId xmlns:a16="http://schemas.microsoft.com/office/drawing/2014/main" id="{F89CDF0B-B07E-E667-4F40-D59D7F412127}"/>
+              </a:ext>
+            </a:extLst>
+          </p:cNvPr>
+          <p:cNvSpPr/>
+          <p:nvPr/>
+        </p:nvSpPr>
+        <p:spPr>
+          <a:xfrm>
+            <a:off x="6286500" y="3979532"/>
+            <a:ext cx="1958079" cy="1773568"/>
+          </a:xfrm>
+          <a:prstGeom prst="roundRect">
+            <a:avLst/>
+          </a:prstGeom>
+          <a:noFill/>
+          <a:ln w="25400" cap="flat" cmpd="sng" algn="ctr">
+            <a:solidFill>
+              <a:srgbClr val="00B050"/>
+            </a:solidFill>
+            <a:prstDash val="dash"/>
+            <a:round/>
+            <a:headEnd type="none" w="med" len="med"/>
+            <a:tailEnd type="none" w="med" len="med"/>
+            <a:extLst>
+              <a:ext uri="{C807C97D-BFC1-408E-A445-0C87EB9F89A2}">
+                <ask:lineSketchStyleProps xmlns:ask="http://schemas.microsoft.com/office/drawing/2018/sketchyshapes">
+                  <ask:type>
+                    <ask:lineSketchNone/>
+                  </ask:type>
+                </ask:lineSketchStyleProps>
+              </a:ext>
+            </a:extLst>
+          </a:ln>
+        </p:spPr>
+        <p:style>
+          <a:lnRef idx="0">
+            <a:scrgbClr r="0" g="0" b="0"/>
+          </a:lnRef>
+          <a:fillRef idx="0">
+            <a:scrgbClr r="0" g="0" b="0"/>
+          </a:fillRef>
+          <a:effectRef idx="0">
+            <a:scrgbClr r="0" g="0" b="0"/>
+          </a:effectRef>
+          <a:fontRef idx="minor">
+            <a:schemeClr val="accent1"/>
+          </a:fontRef>
+        </p:style>
+        <p:txBody>
+          <a:bodyPr rtlCol="0" anchor="ctr"/>
+          <a:lstStyle/>
+          <a:p>
+            <a:pPr algn="ctr"/>
+            <a:endParaRPr lang="en-US"/>
+          </a:p>
+        </p:txBody>
+      </p:sp>
+      <p:cxnSp>
+        <p:nvCxnSpPr>
+          <p:cNvPr id="29" name="Straight Connector 28">
+            <a:extLst>
+              <a:ext uri="{FF2B5EF4-FFF2-40B4-BE49-F238E27FC236}">
+                <a16:creationId xmlns:a16="http://schemas.microsoft.com/office/drawing/2014/main" id="{3FDA0C25-0D7E-8744-0825-D6AE2D85F2CE}"/>
+              </a:ext>
+            </a:extLst>
+          </p:cNvPr>
+          <p:cNvCxnSpPr>
+            <a:cxnSpLocks/>
+            <a:stCxn id="10" idx="1"/>
+            <a:endCxn id="3" idx="3"/>
+          </p:cNvCxnSpPr>
+          <p:nvPr/>
+        </p:nvCxnSpPr>
+        <p:spPr>
+          <a:xfrm flipH="1">
+            <a:off x="8077664" y="4532969"/>
+            <a:ext cx="650078" cy="0"/>
+          </a:xfrm>
+          <a:prstGeom prst="line">
+            <a:avLst/>
+          </a:prstGeom>
+          <a:ln w="28575">
+            <a:solidFill>
+              <a:srgbClr val="FF0000"/>
+            </a:solidFill>
+          </a:ln>
+        </p:spPr>
+        <p:style>
+          <a:lnRef idx="1">
+            <a:schemeClr val="accent1"/>
+          </a:lnRef>
+          <a:fillRef idx="0">
+            <a:schemeClr val="accent1"/>
+          </a:fillRef>
+          <a:effectRef idx="0">
+            <a:schemeClr val="accent1"/>
+          </a:effectRef>
+          <a:fontRef idx="minor">
+            <a:schemeClr val="tx1"/>
+          </a:fontRef>
+        </p:style>
+      </p:cxnSp>
+      <p:sp>
+        <p:nvSpPr>
+          <p:cNvPr id="36" name="TextBox 35">
+            <a:extLst>
+              <a:ext uri="{FF2B5EF4-FFF2-40B4-BE49-F238E27FC236}">
+                <a16:creationId xmlns:a16="http://schemas.microsoft.com/office/drawing/2014/main" id="{5913BD1D-617E-32C1-E8CC-8FB7493B42AA}"/>
+              </a:ext>
+            </a:extLst>
+          </p:cNvPr>
+          <p:cNvSpPr txBox="1"/>
+          <p:nvPr/>
+        </p:nvSpPr>
+        <p:spPr>
+          <a:xfrm>
+            <a:off x="8228846" y="4168939"/>
+            <a:ext cx="757511" cy="369332"/>
+          </a:xfrm>
+          <a:prstGeom prst="rect">
+            <a:avLst/>
+          </a:prstGeom>
+          <a:noFill/>
+        </p:spPr>
+        <p:txBody>
+          <a:bodyPr wrap="square" rtlCol="0">
+            <a:spAutoFit/>
+          </a:bodyPr>
+          <a:lstStyle/>
+          <a:p>
+            <a:r>
+              <a:rPr lang="en-US" dirty="0">
+                <a:solidFill>
+                  <a:srgbClr val="FF0000"/>
+                </a:solidFill>
+              </a:rPr>
+              <a:t>5V</a:t>
+            </a:r>
+          </a:p>
+        </p:txBody>
+      </p:sp>
+      <p:sp>
+        <p:nvSpPr>
+          <p:cNvPr id="37" name="Rectangle 36">
+            <a:extLst>
+              <a:ext uri="{FF2B5EF4-FFF2-40B4-BE49-F238E27FC236}">
+                <a16:creationId xmlns:a16="http://schemas.microsoft.com/office/drawing/2014/main" id="{E99CE273-7269-2507-8A93-A8E337F6F18A}"/>
+              </a:ext>
+            </a:extLst>
+          </p:cNvPr>
+          <p:cNvSpPr/>
+          <p:nvPr/>
+        </p:nvSpPr>
+        <p:spPr>
+          <a:xfrm>
+            <a:off x="7082462" y="3092033"/>
+            <a:ext cx="2792896" cy="483293"/>
+          </a:xfrm>
+          <a:prstGeom prst="rect">
+            <a:avLst/>
+          </a:prstGeom>
+        </p:spPr>
+        <p:style>
+          <a:lnRef idx="2">
+            <a:schemeClr val="accent1">
+              <a:shade val="15000"/>
+            </a:schemeClr>
+          </a:lnRef>
+          <a:fillRef idx="1">
+            <a:schemeClr val="accent1"/>
+          </a:fillRef>
+          <a:effectRef idx="0">
+            <a:schemeClr val="accent1"/>
+          </a:effectRef>
+          <a:fontRef idx="minor">
+            <a:schemeClr val="lt1"/>
+          </a:fontRef>
+        </p:style>
+        <p:txBody>
+          <a:bodyPr rtlCol="0" anchor="ctr"/>
+          <a:lstStyle/>
+          <a:p>
+            <a:pPr algn="ctr"/>
+            <a:r>
+              <a:rPr lang="en-US" b="0" i="0" dirty="0">
+                <a:solidFill>
+                  <a:schemeClr val="bg1"/>
+                </a:solidFill>
+                <a:effectLst/>
+                <a:latin typeface="Proxima Nova"/>
+              </a:rPr>
+              <a:t>7-segment display</a:t>
+            </a:r>
+            <a:endParaRPr lang="en-US" dirty="0">
+              <a:solidFill>
+                <a:schemeClr val="bg1"/>
+              </a:solidFill>
+            </a:endParaRPr>
+          </a:p>
+        </p:txBody>
+      </p:sp>
     </p:spTree>
     <p:extLst>
       <p:ext uri="{BB962C8B-B14F-4D97-AF65-F5344CB8AC3E}">

</xml_diff>

<commit_message>
added software diagram and python classes
</commit_message>
<xml_diff>
--- a/project_01/docs/Tucker_EDES301_project_01_proposal.pptx
+++ b/project_01/docs/Tucker_EDES301_project_01_proposal.pptx
@@ -5,10 +5,10 @@
     <p:sldMasterId id="2147483648" r:id="rId1"/>
   </p:sldMasterIdLst>
   <p:notesMasterIdLst>
-    <p:notesMasterId r:id="rId12"/>
+    <p:notesMasterId r:id="rId14"/>
   </p:notesMasterIdLst>
   <p:handoutMasterIdLst>
-    <p:handoutMasterId r:id="rId13"/>
+    <p:handoutMasterId r:id="rId15"/>
   </p:handoutMasterIdLst>
   <p:sldIdLst>
     <p:sldId id="261" r:id="rId2"/>
@@ -21,6 +21,8 @@
     <p:sldId id="376" r:id="rId9"/>
     <p:sldId id="370" r:id="rId10"/>
     <p:sldId id="369" r:id="rId11"/>
+    <p:sldId id="378" r:id="rId12"/>
+    <p:sldId id="379" r:id="rId13"/>
   </p:sldIdLst>
   <p:sldSz cx="12192000" cy="6858000"/>
   <p:notesSz cx="6858000" cy="9144000"/>
@@ -223,7 +225,7 @@
           <a:p>
             <a:fld id="{59041DB8-B66F-4DC8-A96E-33677E0F90FF}" type="datetimeFigureOut">
               <a:rPr lang="en-US" smtClean="0"/>
-              <a:t>2/28/25</a:t>
+              <a:t>3/7/25</a:t>
             </a:fld>
             <a:endParaRPr lang="en-US"/>
           </a:p>
@@ -388,7 +390,7 @@
           <a:p>
             <a:fld id="{DEB49C4A-65AC-492D-9701-81B46C3AD0E4}" type="datetimeFigureOut">
               <a:rPr lang="en-US" smtClean="0"/>
-              <a:t>2/28/25</a:t>
+              <a:t>3/7/25</a:t>
             </a:fld>
             <a:endParaRPr lang="en-US"/>
           </a:p>
@@ -2796,7 +2798,7 @@
           <a:p>
             <a:fld id="{384A29A4-78C8-47AB-BA06-22CB45938951}" type="datetime1">
               <a:rPr lang="en-US" smtClean="0"/>
-              <a:t>2/28/25</a:t>
+              <a:t>3/7/25</a:t>
             </a:fld>
             <a:endParaRPr lang="en-US"/>
           </a:p>
@@ -2991,7 +2993,7 @@
           <a:p>
             <a:fld id="{E1ED4ACF-2D82-46F2-A8E9-23963AA34E86}" type="datetime1">
               <a:rPr lang="en-US" smtClean="0"/>
-              <a:t>2/28/25</a:t>
+              <a:t>3/7/25</a:t>
             </a:fld>
             <a:endParaRPr lang="en-US"/>
           </a:p>
@@ -3185,7 +3187,7 @@
           <a:p>
             <a:fld id="{AE374B5B-21A0-4192-BF4C-38187F1A68D8}" type="datetime1">
               <a:rPr lang="en-US" smtClean="0"/>
-              <a:t>2/28/25</a:t>
+              <a:t>3/7/25</a:t>
             </a:fld>
             <a:endParaRPr lang="en-US"/>
           </a:p>
@@ -5526,7 +5528,7 @@
           <a:p>
             <a:fld id="{33B5CF7C-B333-48E1-A4A6-83A3C8B73AC0}" type="datetime1">
               <a:rPr lang="en-US" smtClean="0"/>
-              <a:t>2/28/25</a:t>
+              <a:t>3/7/25</a:t>
             </a:fld>
             <a:endParaRPr lang="en-US"/>
           </a:p>
@@ -5979,7 +5981,7 @@
           <a:p>
             <a:fld id="{AE320762-5CBF-4210-AB54-376B091119F8}" type="datetime1">
               <a:rPr lang="en-US" smtClean="0"/>
-              <a:t>2/28/25</a:t>
+              <a:t>3/7/25</a:t>
             </a:fld>
             <a:endParaRPr lang="en-US"/>
           </a:p>
@@ -6111,7 +6113,7 @@
           <a:p>
             <a:fld id="{7F0DB371-BF5F-4058-A212-1A908E4D2674}" type="datetime1">
               <a:rPr lang="en-US" smtClean="0"/>
-              <a:t>2/28/25</a:t>
+              <a:t>3/7/25</a:t>
             </a:fld>
             <a:endParaRPr lang="en-US"/>
           </a:p>
@@ -8044,7 +8046,7 @@
           <a:p>
             <a:fld id="{60A4083B-90AA-48CF-BAD5-00AA24D7F288}" type="datetime1">
               <a:rPr lang="en-US" smtClean="0"/>
-              <a:t>2/28/25</a:t>
+              <a:t>3/7/25</a:t>
             </a:fld>
             <a:endParaRPr lang="en-US"/>
           </a:p>
@@ -10303,7 +10305,7 @@
             <a:fld id="{F5BAF629-ECA2-4CF3-B790-9D9BDED98269}" type="datetime1">
               <a:rPr lang="en-US" smtClean="0"/>
               <a:pPr/>
-              <a:t>2/28/25</a:t>
+              <a:t>3/7/25</a:t>
             </a:fld>
             <a:endParaRPr lang="en-US"/>
           </a:p>
@@ -14598,7 +14600,7 @@
             <a:fld id="{B51B2453-8663-4C69-AF73-9FD7B1DEC5D0}" type="datetime1">
               <a:rPr lang="en-US" smtClean="0"/>
               <a:pPr/>
-              <a:t>2/28/25</a:t>
+              <a:t>3/7/25</a:t>
             </a:fld>
             <a:endParaRPr lang="en-US" dirty="0"/>
           </a:p>
@@ -15129,7 +15131,7 @@
           <a:p>
             <a:r>
               <a:rPr lang="en-US" dirty="0"/>
-              <a:t>Updated February 28, 2025</a:t>
+              <a:t>Updated March 7, 2025</a:t>
             </a:r>
           </a:p>
           <a:p>
@@ -15226,7 +15228,7 @@
             <p:ph idx="1"/>
             <p:extLst>
               <p:ext uri="{D42A27DB-BD31-4B8C-83A1-F6EECF244321}">
-                <p14:modId xmlns:p14="http://schemas.microsoft.com/office/powerpoint/2010/main" val="1643906721"/>
+                <p14:modId xmlns:p14="http://schemas.microsoft.com/office/powerpoint/2010/main" val="4120800027"/>
               </p:ext>
             </p:extLst>
           </p:nvPr>
@@ -15632,7 +15634,7 @@
                     <a:lstStyle/>
                     <a:p>
                       <a:r>
-                        <a:rPr lang="en-US" dirty="0"/>
+                        <a:rPr lang="en-US" strike="sngStrike" dirty="0"/>
                         <a:t>7-segment display</a:t>
                       </a:r>
                     </a:p>
@@ -15645,7 +15647,7 @@
                     <a:lstStyle/>
                     <a:p>
                       <a:r>
-                        <a:rPr lang="en-US" dirty="0"/>
+                        <a:rPr lang="en-US" strike="sngStrike" dirty="0"/>
                         <a:t>In parts kit</a:t>
                       </a:r>
                     </a:p>
@@ -15658,7 +15660,7 @@
                     <a:lstStyle/>
                     <a:p>
                       <a:r>
-                        <a:rPr lang="en-US" dirty="0"/>
+                        <a:rPr lang="en-US" strike="sngStrike" dirty="0"/>
                         <a:t>--</a:t>
                       </a:r>
                     </a:p>
@@ -15771,6 +15773,237 @@
     <p:extLst>
       <p:ext uri="{BB962C8B-B14F-4D97-AF65-F5344CB8AC3E}">
         <p14:creationId xmlns:p14="http://schemas.microsoft.com/office/powerpoint/2010/main" val="1131248096"/>
+      </p:ext>
+    </p:extLst>
+  </p:cSld>
+  <p:clrMapOvr>
+    <a:masterClrMapping/>
+  </p:clrMapOvr>
+  <mc:AlternateContent xmlns:mc="http://schemas.openxmlformats.org/markup-compatibility/2006" xmlns:p14="http://schemas.microsoft.com/office/powerpoint/2010/main">
+    <mc:Choice Requires="p14">
+      <p:transition spd="med" p14:dur="700">
+        <p:fade/>
+      </p:transition>
+    </mc:Choice>
+    <mc:Fallback xmlns="">
+      <p:transition spd="med">
+        <p:fade/>
+      </p:transition>
+    </mc:Fallback>
+  </mc:AlternateContent>
+</p:sld>
+</file>
+
+<file path=ppt/slides/slide11.xml><?xml version="1.0" encoding="utf-8"?>
+<p:sld xmlns:a="http://schemas.openxmlformats.org/drawingml/2006/main" xmlns:r="http://schemas.openxmlformats.org/officeDocument/2006/relationships" xmlns:p="http://schemas.openxmlformats.org/presentationml/2006/main">
+  <p:cSld>
+    <p:spTree>
+      <p:nvGrpSpPr>
+        <p:cNvPr id="1" name=""/>
+        <p:cNvGrpSpPr/>
+        <p:nvPr/>
+      </p:nvGrpSpPr>
+      <p:grpSpPr>
+        <a:xfrm>
+          <a:off x="0" y="0"/>
+          <a:ext cx="0" cy="0"/>
+          <a:chOff x="0" y="0"/>
+          <a:chExt cx="0" cy="0"/>
+        </a:xfrm>
+      </p:grpSpPr>
+      <p:sp>
+        <p:nvSpPr>
+          <p:cNvPr id="2" name="Title 1">
+            <a:extLst>
+              <a:ext uri="{FF2B5EF4-FFF2-40B4-BE49-F238E27FC236}">
+                <a16:creationId xmlns:a16="http://schemas.microsoft.com/office/drawing/2014/main" id="{864DAC4F-0AA2-7287-E12E-227F6C8D6143}"/>
+              </a:ext>
+            </a:extLst>
+          </p:cNvPr>
+          <p:cNvSpPr>
+            <a:spLocks noGrp="1"/>
+          </p:cNvSpPr>
+          <p:nvPr>
+            <p:ph type="title"/>
+          </p:nvPr>
+        </p:nvSpPr>
+        <p:spPr/>
+        <p:txBody>
+          <a:bodyPr/>
+          <a:lstStyle/>
+          <a:p>
+            <a:r>
+              <a:rPr lang="en-US" dirty="0"/>
+              <a:t>Software Diagram</a:t>
+            </a:r>
+          </a:p>
+        </p:txBody>
+      </p:sp>
+      <p:pic>
+        <p:nvPicPr>
+          <p:cNvPr id="5" name="Content Placeholder 4" descr="A diagram of a program&#10;&#10;AI-generated content may be incorrect.">
+            <a:extLst>
+              <a:ext uri="{FF2B5EF4-FFF2-40B4-BE49-F238E27FC236}">
+                <a16:creationId xmlns:a16="http://schemas.microsoft.com/office/drawing/2014/main" id="{916DF527-A2FE-8921-17BA-02225802F5A0}"/>
+              </a:ext>
+            </a:extLst>
+          </p:cNvPr>
+          <p:cNvPicPr>
+            <a:picLocks noGrp="1" noChangeAspect="1"/>
+          </p:cNvPicPr>
+          <p:nvPr>
+            <p:ph idx="1"/>
+          </p:nvPr>
+        </p:nvPicPr>
+        <p:blipFill>
+          <a:blip r:embed="rId2"/>
+          <a:stretch>
+            <a:fillRect/>
+          </a:stretch>
+        </p:blipFill>
+        <p:spPr>
+          <a:xfrm>
+            <a:off x="1670064" y="1143001"/>
+            <a:ext cx="8851872" cy="4959247"/>
+          </a:xfrm>
+        </p:spPr>
+      </p:pic>
+    </p:spTree>
+    <p:extLst>
+      <p:ext uri="{BB962C8B-B14F-4D97-AF65-F5344CB8AC3E}">
+        <p14:creationId xmlns:p14="http://schemas.microsoft.com/office/powerpoint/2010/main" val="198242378"/>
+      </p:ext>
+    </p:extLst>
+  </p:cSld>
+  <p:clrMapOvr>
+    <a:masterClrMapping/>
+  </p:clrMapOvr>
+  <mc:AlternateContent xmlns:mc="http://schemas.openxmlformats.org/markup-compatibility/2006" xmlns:p14="http://schemas.microsoft.com/office/powerpoint/2010/main">
+    <mc:Choice Requires="p14">
+      <p:transition spd="med" p14:dur="700">
+        <p:fade/>
+      </p:transition>
+    </mc:Choice>
+    <mc:Fallback xmlns="">
+      <p:transition spd="med">
+        <p:fade/>
+      </p:transition>
+    </mc:Fallback>
+  </mc:AlternateContent>
+</p:sld>
+</file>
+
+<file path=ppt/slides/slide12.xml><?xml version="1.0" encoding="utf-8"?>
+<p:sld xmlns:a="http://schemas.openxmlformats.org/drawingml/2006/main" xmlns:r="http://schemas.openxmlformats.org/officeDocument/2006/relationships" xmlns:p="http://schemas.openxmlformats.org/presentationml/2006/main">
+  <p:cSld>
+    <p:spTree>
+      <p:nvGrpSpPr>
+        <p:cNvPr id="1" name=""/>
+        <p:cNvGrpSpPr/>
+        <p:nvPr/>
+      </p:nvGrpSpPr>
+      <p:grpSpPr>
+        <a:xfrm>
+          <a:off x="0" y="0"/>
+          <a:ext cx="0" cy="0"/>
+          <a:chOff x="0" y="0"/>
+          <a:chExt cx="0" cy="0"/>
+        </a:xfrm>
+      </p:grpSpPr>
+      <p:sp>
+        <p:nvSpPr>
+          <p:cNvPr id="2" name="Title 1">
+            <a:extLst>
+              <a:ext uri="{FF2B5EF4-FFF2-40B4-BE49-F238E27FC236}">
+                <a16:creationId xmlns:a16="http://schemas.microsoft.com/office/drawing/2014/main" id="{4B685156-8D91-303A-81D0-5AC8C06AFC09}"/>
+              </a:ext>
+            </a:extLst>
+          </p:cNvPr>
+          <p:cNvSpPr>
+            <a:spLocks noGrp="1"/>
+          </p:cNvSpPr>
+          <p:nvPr>
+            <p:ph type="title"/>
+          </p:nvPr>
+        </p:nvSpPr>
+        <p:spPr/>
+        <p:txBody>
+          <a:bodyPr/>
+          <a:lstStyle/>
+          <a:p>
+            <a:r>
+              <a:rPr lang="en-US" dirty="0"/>
+              <a:t>Python Classes</a:t>
+            </a:r>
+          </a:p>
+        </p:txBody>
+      </p:sp>
+      <p:sp>
+        <p:nvSpPr>
+          <p:cNvPr id="3" name="Content Placeholder 2">
+            <a:extLst>
+              <a:ext uri="{FF2B5EF4-FFF2-40B4-BE49-F238E27FC236}">
+                <a16:creationId xmlns:a16="http://schemas.microsoft.com/office/drawing/2014/main" id="{DB000229-F6B3-34A9-8099-C14C1F6C3B72}"/>
+              </a:ext>
+            </a:extLst>
+          </p:cNvPr>
+          <p:cNvSpPr>
+            <a:spLocks noGrp="1"/>
+          </p:cNvSpPr>
+          <p:nvPr>
+            <p:ph idx="1"/>
+          </p:nvPr>
+        </p:nvSpPr>
+        <p:spPr/>
+        <p:txBody>
+          <a:bodyPr/>
+          <a:lstStyle/>
+          <a:p>
+            <a:r>
+              <a:rPr lang="en-US" dirty="0"/>
+              <a:t>System inputs</a:t>
+            </a:r>
+          </a:p>
+          <a:p>
+            <a:pPr lvl="1"/>
+            <a:r>
+              <a:rPr lang="en-US" dirty="0"/>
+              <a:t>3 buttons (up, down, power/multipurpose)</a:t>
+            </a:r>
+          </a:p>
+          <a:p>
+            <a:r>
+              <a:rPr lang="en-US" dirty="0"/>
+              <a:t>System outputs</a:t>
+            </a:r>
+          </a:p>
+          <a:p>
+            <a:pPr lvl="1"/>
+            <a:r>
+              <a:rPr lang="en-US" dirty="0"/>
+              <a:t>LCD screen</a:t>
+            </a:r>
+          </a:p>
+          <a:p>
+            <a:pPr lvl="1"/>
+            <a:r>
+              <a:rPr lang="en-US" dirty="0"/>
+              <a:t>Servo</a:t>
+            </a:r>
+          </a:p>
+          <a:p>
+            <a:pPr lvl="1"/>
+            <a:r>
+              <a:rPr lang="en-US" dirty="0"/>
+              <a:t>LED pixel matrix</a:t>
+            </a:r>
+          </a:p>
+        </p:txBody>
+      </p:sp>
+    </p:spTree>
+    <p:extLst>
+      <p:ext uri="{BB962C8B-B14F-4D97-AF65-F5344CB8AC3E}">
+        <p14:creationId xmlns:p14="http://schemas.microsoft.com/office/powerpoint/2010/main" val="2534834662"/>
       </p:ext>
     </p:extLst>
   </p:cSld>
@@ -17382,19 +17615,7 @@
               <a:rPr lang="en-US" dirty="0">
                 <a:sym typeface="Wingdings" pitchFamily="2" charset="2"/>
               </a:rPr>
-              <a:t> Ability to set duration of study session and break</a:t>
-            </a:r>
-          </a:p>
-          <a:p>
-            <a:pPr>
-              <a:buFont typeface="Wingdings" pitchFamily="2" charset="2"/>
-              <a:buChar char="Ø"/>
-            </a:pPr>
-            <a:r>
-              <a:rPr lang="en-US" dirty="0">
-                <a:sym typeface="Wingdings" pitchFamily="2" charset="2"/>
-              </a:rPr>
-              <a:t> Ability to choose to program a longer break after 4 pomodoros (yes/no)</a:t>
+              <a:t> Ability to set duration of study session and breaks</a:t>
             </a:r>
           </a:p>
           <a:p>
@@ -18410,7 +18631,7 @@
           <a:p>
             <a:pPr algn="ctr"/>
             <a:r>
-              <a:rPr lang="en-US" b="0" i="0" dirty="0">
+              <a:rPr lang="en-US" b="0" i="0" strike="sngStrike" dirty="0">
                 <a:solidFill>
                   <a:schemeClr val="bg1"/>
                 </a:solidFill>
@@ -18419,7 +18640,7 @@
               </a:rPr>
               <a:t>7-segment display</a:t>
             </a:r>
-            <a:endParaRPr lang="en-US" dirty="0">
+            <a:endParaRPr lang="en-US" strike="sngStrike" dirty="0">
               <a:solidFill>
                 <a:schemeClr val="bg1"/>
               </a:solidFill>
@@ -19436,7 +19657,7 @@
           <a:p>
             <a:pPr algn="ctr"/>
             <a:r>
-              <a:rPr lang="en-US" b="0" i="0" dirty="0">
+              <a:rPr lang="en-US" b="0" i="0" strike="sngStrike" dirty="0">
                 <a:solidFill>
                   <a:schemeClr val="bg1"/>
                 </a:solidFill>
@@ -19445,7 +19666,7 @@
               </a:rPr>
               <a:t>7-segment display</a:t>
             </a:r>
-            <a:endParaRPr lang="en-US" dirty="0">
+            <a:endParaRPr lang="en-US" strike="sngStrike" dirty="0">
               <a:solidFill>
                 <a:schemeClr val="bg1"/>
               </a:solidFill>

</xml_diff>